<commit_message>
added slides with ARM advantages
</commit_message>
<xml_diff>
--- a/slides/Despliegue continuo de tu infrastructura cloud con Azure ARM templates.pptx
+++ b/slides/Despliegue continuo de tu infrastructura cloud con Azure ARM templates.pptx
@@ -5,7 +5,7 @@
     <p:sldMasterId id="2147483670" r:id="rId2"/>
   </p:sldMasterIdLst>
   <p:notesMasterIdLst>
-    <p:notesMasterId r:id="rId10"/>
+    <p:notesMasterId r:id="rId14"/>
   </p:notesMasterIdLst>
   <p:sldIdLst>
     <p:sldId id="332" r:id="rId3"/>
@@ -13,8 +13,12 @@
     <p:sldId id="325" r:id="rId5"/>
     <p:sldId id="326" r:id="rId6"/>
     <p:sldId id="333" r:id="rId7"/>
-    <p:sldId id="295" r:id="rId8"/>
-    <p:sldId id="293" r:id="rId9"/>
+    <p:sldId id="334" r:id="rId8"/>
+    <p:sldId id="335" r:id="rId9"/>
+    <p:sldId id="336" r:id="rId10"/>
+    <p:sldId id="337" r:id="rId11"/>
+    <p:sldId id="295" r:id="rId12"/>
+    <p:sldId id="293" r:id="rId13"/>
   </p:sldIdLst>
   <p:sldSz cx="12192000" cy="6858000"/>
   <p:notesSz cx="6858000" cy="9144000"/>
@@ -131,6 +135,10 @@
           <p14:sldIdLst>
             <p14:sldId id="326"/>
             <p14:sldId id="333"/>
+            <p14:sldId id="334"/>
+            <p14:sldId id="335"/>
+            <p14:sldId id="336"/>
+            <p14:sldId id="337"/>
           </p14:sldIdLst>
         </p14:section>
         <p14:section name="Ending" id="{40438540-D5F8-47EC-B1E3-0407946D06ED}">
@@ -921,7 +929,7 @@
           <a:p>
             <a:fld id="{DF61EA0F-A667-4B49-8422-0062BC55E249}" type="slidenum">
               <a:rPr lang="en-US" smtClean="0"/>
-              <a:t>6</a:t>
+              <a:t>10</a:t>
             </a:fld>
             <a:endParaRPr lang="en-US"/>
           </a:p>
@@ -1005,7 +1013,7 @@
           <a:p>
             <a:fld id="{DF61EA0F-A667-4B49-8422-0062BC55E249}" type="slidenum">
               <a:rPr lang="en-US" smtClean="0"/>
-              <a:t>7</a:t>
+              <a:t>11</a:t>
             </a:fld>
             <a:endParaRPr lang="en-US"/>
           </a:p>
@@ -11701,15 +11709,7 @@
           <a:p>
             <a:r>
               <a:rPr lang="es-ES" dirty="0"/>
-              <a:t>Despliegue continuo de tu </a:t>
-            </a:r>
-            <a:r>
-              <a:rPr lang="es-ES" dirty="0" err="1"/>
-              <a:t>infrastructura</a:t>
-            </a:r>
-            <a:r>
-              <a:rPr lang="es-ES" dirty="0"/>
-              <a:t> </a:t>
+              <a:t>Despliegue continuo de tu infraestructura </a:t>
             </a:r>
             <a:r>
               <a:rPr lang="es-ES" dirty="0" err="1"/>
@@ -11759,6 +11759,69 @@
     <p:extLst>
       <p:ext uri="{BB962C8B-B14F-4D97-AF65-F5344CB8AC3E}">
         <p14:creationId xmlns:p14="http://schemas.microsoft.com/office/powerpoint/2010/main" val="1644040282"/>
+      </p:ext>
+    </p:extLst>
+  </p:cSld>
+  <p:clrMapOvr>
+    <a:masterClrMapping/>
+  </p:clrMapOvr>
+</p:sld>
+</file>
+
+<file path=ppt/slides/slide10.xml><?xml version="1.0" encoding="utf-8"?>
+<p:sld xmlns:a="http://schemas.openxmlformats.org/drawingml/2006/main" xmlns:r="http://schemas.openxmlformats.org/officeDocument/2006/relationships" xmlns:p="http://schemas.openxmlformats.org/presentationml/2006/main">
+  <p:cSld>
+    <p:spTree>
+      <p:nvGrpSpPr>
+        <p:cNvPr id="1" name=""/>
+        <p:cNvGrpSpPr/>
+        <p:nvPr/>
+      </p:nvGrpSpPr>
+      <p:grpSpPr>
+        <a:xfrm>
+          <a:off x="0" y="0"/>
+          <a:ext cx="0" cy="0"/>
+          <a:chOff x="0" y="0"/>
+          <a:chExt cx="0" cy="0"/>
+        </a:xfrm>
+      </p:grpSpPr>
+    </p:spTree>
+    <p:extLst>
+      <p:ext uri="{BB962C8B-B14F-4D97-AF65-F5344CB8AC3E}">
+        <p14:creationId xmlns:p14="http://schemas.microsoft.com/office/powerpoint/2010/main" val="4195810610"/>
+      </p:ext>
+    </p:extLst>
+  </p:cSld>
+  <p:clrMapOvr>
+    <a:masterClrMapping/>
+  </p:clrMapOvr>
+  <p:transition spd="slow">
+    <p:cover/>
+  </p:transition>
+</p:sld>
+</file>
+
+<file path=ppt/slides/slide11.xml><?xml version="1.0" encoding="utf-8"?>
+<p:sld xmlns:a="http://schemas.openxmlformats.org/drawingml/2006/main" xmlns:r="http://schemas.openxmlformats.org/officeDocument/2006/relationships" xmlns:p="http://schemas.openxmlformats.org/presentationml/2006/main">
+  <p:cSld>
+    <p:spTree>
+      <p:nvGrpSpPr>
+        <p:cNvPr id="1" name=""/>
+        <p:cNvGrpSpPr/>
+        <p:nvPr/>
+      </p:nvGrpSpPr>
+      <p:grpSpPr>
+        <a:xfrm>
+          <a:off x="0" y="0"/>
+          <a:ext cx="0" cy="0"/>
+          <a:chOff x="0" y="0"/>
+          <a:chExt cx="0" cy="0"/>
+        </a:xfrm>
+      </p:grpSpPr>
+    </p:spTree>
+    <p:extLst>
+      <p:ext uri="{BB962C8B-B14F-4D97-AF65-F5344CB8AC3E}">
+        <p14:creationId xmlns:p14="http://schemas.microsoft.com/office/powerpoint/2010/main" val="4184162706"/>
       </p:ext>
     </p:extLst>
   </p:cSld>
@@ -12296,19 +12359,49 @@
           <a:chExt cx="0" cy="0"/>
         </a:xfrm>
       </p:grpSpPr>
+      <p:sp>
+        <p:nvSpPr>
+          <p:cNvPr id="2" name="Text Placeholder 1">
+            <a:extLst>
+              <a:ext uri="{FF2B5EF4-FFF2-40B4-BE49-F238E27FC236}">
+                <a16:creationId xmlns:a16="http://schemas.microsoft.com/office/drawing/2014/main" id="{24228185-43F1-4B59-8747-6DFB0C832E28}"/>
+              </a:ext>
+            </a:extLst>
+          </p:cNvPr>
+          <p:cNvSpPr>
+            <a:spLocks noGrp="1"/>
+          </p:cNvSpPr>
+          <p:nvPr>
+            <p:ph type="body" sz="quarter" idx="11"/>
+          </p:nvPr>
+        </p:nvSpPr>
+        <p:spPr/>
+        <p:txBody>
+          <a:bodyPr/>
+          <a:lstStyle/>
+          <a:p>
+            <a:r>
+              <a:rPr lang="en-US" dirty="0"/>
+              <a:t>Azure ARM </a:t>
+            </a:r>
+            <a:r>
+              <a:rPr lang="en-US" dirty="0" err="1"/>
+              <a:t>Ventajas</a:t>
+            </a:r>
+            <a:endParaRPr lang="en-US" dirty="0"/>
+          </a:p>
+        </p:txBody>
+      </p:sp>
     </p:spTree>
     <p:extLst>
       <p:ext uri="{BB962C8B-B14F-4D97-AF65-F5344CB8AC3E}">
-        <p14:creationId xmlns:p14="http://schemas.microsoft.com/office/powerpoint/2010/main" val="4195810610"/>
+        <p14:creationId xmlns:p14="http://schemas.microsoft.com/office/powerpoint/2010/main" val="3899896632"/>
       </p:ext>
     </p:extLst>
   </p:cSld>
   <p:clrMapOvr>
     <a:masterClrMapping/>
   </p:clrMapOvr>
-  <p:transition spd="slow">
-    <p:cover/>
-  </p:transition>
 </p:sld>
 </file>
 
@@ -12329,10 +12422,508 @@
           <a:chExt cx="0" cy="0"/>
         </a:xfrm>
       </p:grpSpPr>
+      <p:sp>
+        <p:nvSpPr>
+          <p:cNvPr id="3" name="Title 2">
+            <a:extLst>
+              <a:ext uri="{FF2B5EF4-FFF2-40B4-BE49-F238E27FC236}">
+                <a16:creationId xmlns:a16="http://schemas.microsoft.com/office/drawing/2014/main" id="{1AB88118-3C4F-497A-89A9-11D1CAEC39BC}"/>
+              </a:ext>
+            </a:extLst>
+          </p:cNvPr>
+          <p:cNvSpPr>
+            <a:spLocks noGrp="1"/>
+          </p:cNvSpPr>
+          <p:nvPr>
+            <p:ph type="title"/>
+          </p:nvPr>
+        </p:nvSpPr>
+        <p:spPr/>
+        <p:txBody>
+          <a:bodyPr/>
+          <a:lstStyle/>
+          <a:p>
+            <a:r>
+              <a:rPr lang="en-US" dirty="0"/>
+              <a:t>Monolithic Applications</a:t>
+            </a:r>
+          </a:p>
+        </p:txBody>
+      </p:sp>
+      <p:pic>
+        <p:nvPicPr>
+          <p:cNvPr id="4" name="Picture 3">
+            <a:extLst>
+              <a:ext uri="{FF2B5EF4-FFF2-40B4-BE49-F238E27FC236}">
+                <a16:creationId xmlns:a16="http://schemas.microsoft.com/office/drawing/2014/main" id="{43586F70-15D1-47B9-8ADE-D786482400FD}"/>
+              </a:ext>
+            </a:extLst>
+          </p:cNvPr>
+          <p:cNvPicPr>
+            <a:picLocks noChangeAspect="1"/>
+          </p:cNvPicPr>
+          <p:nvPr/>
+        </p:nvPicPr>
+        <p:blipFill>
+          <a:blip r:embed="rId2"/>
+          <a:stretch>
+            <a:fillRect/>
+          </a:stretch>
+        </p:blipFill>
+        <p:spPr>
+          <a:xfrm>
+            <a:off x="4231467" y="1515885"/>
+            <a:ext cx="3729065" cy="5167350"/>
+          </a:xfrm>
+          <a:prstGeom prst="rect">
+            <a:avLst/>
+          </a:prstGeom>
+        </p:spPr>
+      </p:pic>
     </p:spTree>
     <p:extLst>
       <p:ext uri="{BB962C8B-B14F-4D97-AF65-F5344CB8AC3E}">
-        <p14:creationId xmlns:p14="http://schemas.microsoft.com/office/powerpoint/2010/main" val="4184162706"/>
+        <p14:creationId xmlns:p14="http://schemas.microsoft.com/office/powerpoint/2010/main" val="114682436"/>
+      </p:ext>
+    </p:extLst>
+  </p:cSld>
+  <p:clrMapOvr>
+    <a:masterClrMapping/>
+  </p:clrMapOvr>
+</p:sld>
+</file>
+
+<file path=ppt/slides/slide8.xml><?xml version="1.0" encoding="utf-8"?>
+<p:sld xmlns:a="http://schemas.openxmlformats.org/drawingml/2006/main" xmlns:r="http://schemas.openxmlformats.org/officeDocument/2006/relationships" xmlns:p="http://schemas.openxmlformats.org/presentationml/2006/main">
+  <p:cSld>
+    <p:spTree>
+      <p:nvGrpSpPr>
+        <p:cNvPr id="1" name=""/>
+        <p:cNvGrpSpPr/>
+        <p:nvPr/>
+      </p:nvGrpSpPr>
+      <p:grpSpPr>
+        <a:xfrm>
+          <a:off x="0" y="0"/>
+          <a:ext cx="0" cy="0"/>
+          <a:chOff x="0" y="0"/>
+          <a:chExt cx="0" cy="0"/>
+        </a:xfrm>
+      </p:grpSpPr>
+      <p:sp>
+        <p:nvSpPr>
+          <p:cNvPr id="3" name="Title 2">
+            <a:extLst>
+              <a:ext uri="{FF2B5EF4-FFF2-40B4-BE49-F238E27FC236}">
+                <a16:creationId xmlns:a16="http://schemas.microsoft.com/office/drawing/2014/main" id="{1AB88118-3C4F-497A-89A9-11D1CAEC39BC}"/>
+              </a:ext>
+            </a:extLst>
+          </p:cNvPr>
+          <p:cNvSpPr>
+            <a:spLocks noGrp="1"/>
+          </p:cNvSpPr>
+          <p:nvPr>
+            <p:ph type="title"/>
+          </p:nvPr>
+        </p:nvSpPr>
+        <p:spPr/>
+        <p:txBody>
+          <a:bodyPr/>
+          <a:lstStyle/>
+          <a:p>
+            <a:r>
+              <a:rPr lang="en-US" dirty="0"/>
+              <a:t>Microservices Applications</a:t>
+            </a:r>
+          </a:p>
+        </p:txBody>
+      </p:sp>
+      <p:pic>
+        <p:nvPicPr>
+          <p:cNvPr id="2" name="Picture 1">
+            <a:extLst>
+              <a:ext uri="{FF2B5EF4-FFF2-40B4-BE49-F238E27FC236}">
+                <a16:creationId xmlns:a16="http://schemas.microsoft.com/office/drawing/2014/main" id="{CB9A3D82-3A4B-49A4-A9F1-9D9E0B168E1A}"/>
+              </a:ext>
+            </a:extLst>
+          </p:cNvPr>
+          <p:cNvPicPr>
+            <a:picLocks noChangeAspect="1"/>
+          </p:cNvPicPr>
+          <p:nvPr/>
+        </p:nvPicPr>
+        <p:blipFill>
+          <a:blip r:embed="rId2"/>
+          <a:stretch>
+            <a:fillRect/>
+          </a:stretch>
+        </p:blipFill>
+        <p:spPr>
+          <a:xfrm>
+            <a:off x="1920027" y="1503982"/>
+            <a:ext cx="8188250" cy="4887884"/>
+          </a:xfrm>
+          <a:prstGeom prst="rect">
+            <a:avLst/>
+          </a:prstGeom>
+        </p:spPr>
+      </p:pic>
+    </p:spTree>
+    <p:extLst>
+      <p:ext uri="{BB962C8B-B14F-4D97-AF65-F5344CB8AC3E}">
+        <p14:creationId xmlns:p14="http://schemas.microsoft.com/office/powerpoint/2010/main" val="4129268108"/>
+      </p:ext>
+    </p:extLst>
+  </p:cSld>
+  <p:clrMapOvr>
+    <a:masterClrMapping/>
+  </p:clrMapOvr>
+</p:sld>
+</file>
+
+<file path=ppt/slides/slide9.xml><?xml version="1.0" encoding="utf-8"?>
+<p:sld xmlns:a="http://schemas.openxmlformats.org/drawingml/2006/main" xmlns:r="http://schemas.openxmlformats.org/officeDocument/2006/relationships" xmlns:p="http://schemas.openxmlformats.org/presentationml/2006/main">
+  <p:cSld>
+    <p:spTree>
+      <p:nvGrpSpPr>
+        <p:cNvPr id="1" name=""/>
+        <p:cNvGrpSpPr/>
+        <p:nvPr/>
+      </p:nvGrpSpPr>
+      <p:grpSpPr>
+        <a:xfrm>
+          <a:off x="0" y="0"/>
+          <a:ext cx="0" cy="0"/>
+          <a:chOff x="0" y="0"/>
+          <a:chExt cx="0" cy="0"/>
+        </a:xfrm>
+      </p:grpSpPr>
+      <p:sp>
+        <p:nvSpPr>
+          <p:cNvPr id="3" name="Title 2">
+            <a:extLst>
+              <a:ext uri="{FF2B5EF4-FFF2-40B4-BE49-F238E27FC236}">
+                <a16:creationId xmlns:a16="http://schemas.microsoft.com/office/drawing/2014/main" id="{1AB88118-3C4F-497A-89A9-11D1CAEC39BC}"/>
+              </a:ext>
+            </a:extLst>
+          </p:cNvPr>
+          <p:cNvSpPr>
+            <a:spLocks noGrp="1"/>
+          </p:cNvSpPr>
+          <p:nvPr>
+            <p:ph type="title"/>
+          </p:nvPr>
+        </p:nvSpPr>
+        <p:spPr>
+          <a:xfrm>
+            <a:off x="274641" y="365125"/>
+            <a:ext cx="11079159" cy="1325563"/>
+          </a:xfrm>
+        </p:spPr>
+        <p:txBody>
+          <a:bodyPr/>
+          <a:lstStyle/>
+          <a:p>
+            <a:r>
+              <a:rPr lang="en-US"/>
+              <a:t>… and per environment</a:t>
+            </a:r>
+            <a:endParaRPr lang="en-US" dirty="0"/>
+          </a:p>
+        </p:txBody>
+      </p:sp>
+      <p:pic>
+        <p:nvPicPr>
+          <p:cNvPr id="2" name="Picture 1">
+            <a:extLst>
+              <a:ext uri="{FF2B5EF4-FFF2-40B4-BE49-F238E27FC236}">
+                <a16:creationId xmlns:a16="http://schemas.microsoft.com/office/drawing/2014/main" id="{CB9A3D82-3A4B-49A4-A9F1-9D9E0B168E1A}"/>
+              </a:ext>
+            </a:extLst>
+          </p:cNvPr>
+          <p:cNvPicPr>
+            <a:picLocks noChangeAspect="1"/>
+          </p:cNvPicPr>
+          <p:nvPr/>
+        </p:nvPicPr>
+        <p:blipFill>
+          <a:blip r:embed="rId2"/>
+          <a:stretch>
+            <a:fillRect/>
+          </a:stretch>
+        </p:blipFill>
+        <p:spPr>
+          <a:xfrm>
+            <a:off x="274641" y="1690687"/>
+            <a:ext cx="3631534" cy="2167803"/>
+          </a:xfrm>
+          <a:prstGeom prst="rect">
+            <a:avLst/>
+          </a:prstGeom>
+          <a:solidFill>
+            <a:srgbClr val="FFFFFF">
+              <a:shade val="85000"/>
+            </a:srgbClr>
+          </a:solidFill>
+          <a:ln w="88900" cap="sq">
+            <a:solidFill>
+              <a:srgbClr val="FFFFFF"/>
+            </a:solidFill>
+            <a:miter lim="800000"/>
+          </a:ln>
+          <a:effectLst>
+            <a:outerShdw blurRad="55000" dist="18000" dir="5400000" algn="tl" rotWithShape="0">
+              <a:srgbClr val="000000">
+                <a:alpha val="40000"/>
+              </a:srgbClr>
+            </a:outerShdw>
+          </a:effectLst>
+          <a:scene3d>
+            <a:camera prst="orthographicFront"/>
+            <a:lightRig rig="twoPt" dir="t">
+              <a:rot lat="0" lon="0" rev="7200000"/>
+            </a:lightRig>
+          </a:scene3d>
+          <a:sp3d>
+            <a:bevelT w="25400" h="19050"/>
+            <a:contourClr>
+              <a:srgbClr val="FFFFFF"/>
+            </a:contourClr>
+          </a:sp3d>
+        </p:spPr>
+      </p:pic>
+      <p:pic>
+        <p:nvPicPr>
+          <p:cNvPr id="4" name="Picture 3">
+            <a:extLst>
+              <a:ext uri="{FF2B5EF4-FFF2-40B4-BE49-F238E27FC236}">
+                <a16:creationId xmlns:a16="http://schemas.microsoft.com/office/drawing/2014/main" id="{DF563D7A-BC87-4596-BA17-CEBBE3E6EAD1}"/>
+              </a:ext>
+            </a:extLst>
+          </p:cNvPr>
+          <p:cNvPicPr>
+            <a:picLocks noChangeAspect="1"/>
+          </p:cNvPicPr>
+          <p:nvPr/>
+        </p:nvPicPr>
+        <p:blipFill>
+          <a:blip r:embed="rId2"/>
+          <a:stretch>
+            <a:fillRect/>
+          </a:stretch>
+        </p:blipFill>
+        <p:spPr>
+          <a:xfrm>
+            <a:off x="4311854" y="1690687"/>
+            <a:ext cx="3631534" cy="2167803"/>
+          </a:xfrm>
+          <a:prstGeom prst="rect">
+            <a:avLst/>
+          </a:prstGeom>
+          <a:solidFill>
+            <a:srgbClr val="FFFFFF">
+              <a:shade val="85000"/>
+            </a:srgbClr>
+          </a:solidFill>
+          <a:ln w="88900" cap="sq">
+            <a:solidFill>
+              <a:srgbClr val="FFFFFF"/>
+            </a:solidFill>
+            <a:miter lim="800000"/>
+          </a:ln>
+          <a:effectLst>
+            <a:outerShdw blurRad="55000" dist="18000" dir="5400000" algn="tl" rotWithShape="0">
+              <a:srgbClr val="000000">
+                <a:alpha val="40000"/>
+              </a:srgbClr>
+            </a:outerShdw>
+          </a:effectLst>
+          <a:scene3d>
+            <a:camera prst="orthographicFront"/>
+            <a:lightRig rig="twoPt" dir="t">
+              <a:rot lat="0" lon="0" rev="7200000"/>
+            </a:lightRig>
+          </a:scene3d>
+          <a:sp3d>
+            <a:bevelT w="25400" h="19050"/>
+            <a:contourClr>
+              <a:srgbClr val="FFFFFF"/>
+            </a:contourClr>
+          </a:sp3d>
+        </p:spPr>
+      </p:pic>
+      <p:pic>
+        <p:nvPicPr>
+          <p:cNvPr id="5" name="Picture 4">
+            <a:extLst>
+              <a:ext uri="{FF2B5EF4-FFF2-40B4-BE49-F238E27FC236}">
+                <a16:creationId xmlns:a16="http://schemas.microsoft.com/office/drawing/2014/main" id="{34FA5048-23E2-47AC-AE9F-9861FBBE6170}"/>
+              </a:ext>
+            </a:extLst>
+          </p:cNvPr>
+          <p:cNvPicPr>
+            <a:picLocks noChangeAspect="1"/>
+          </p:cNvPicPr>
+          <p:nvPr/>
+        </p:nvPicPr>
+        <p:blipFill>
+          <a:blip r:embed="rId2"/>
+          <a:stretch>
+            <a:fillRect/>
+          </a:stretch>
+        </p:blipFill>
+        <p:spPr>
+          <a:xfrm>
+            <a:off x="8349067" y="1690687"/>
+            <a:ext cx="3631534" cy="2167803"/>
+          </a:xfrm>
+          <a:prstGeom prst="rect">
+            <a:avLst/>
+          </a:prstGeom>
+          <a:solidFill>
+            <a:srgbClr val="FFFFFF">
+              <a:shade val="85000"/>
+            </a:srgbClr>
+          </a:solidFill>
+          <a:ln w="88900" cap="sq">
+            <a:solidFill>
+              <a:srgbClr val="FFFFFF"/>
+            </a:solidFill>
+            <a:miter lim="800000"/>
+          </a:ln>
+          <a:effectLst>
+            <a:outerShdw blurRad="55000" dist="18000" dir="5400000" algn="tl" rotWithShape="0">
+              <a:srgbClr val="000000">
+                <a:alpha val="40000"/>
+              </a:srgbClr>
+            </a:outerShdw>
+          </a:effectLst>
+          <a:scene3d>
+            <a:camera prst="orthographicFront"/>
+            <a:lightRig rig="twoPt" dir="t">
+              <a:rot lat="0" lon="0" rev="7200000"/>
+            </a:lightRig>
+          </a:scene3d>
+          <a:sp3d>
+            <a:bevelT w="25400" h="19050"/>
+            <a:contourClr>
+              <a:srgbClr val="FFFFFF"/>
+            </a:contourClr>
+          </a:sp3d>
+        </p:spPr>
+      </p:pic>
+      <p:sp>
+        <p:nvSpPr>
+          <p:cNvPr id="7" name="TextBox 6">
+            <a:extLst>
+              <a:ext uri="{FF2B5EF4-FFF2-40B4-BE49-F238E27FC236}">
+                <a16:creationId xmlns:a16="http://schemas.microsoft.com/office/drawing/2014/main" id="{86A4BAF7-B668-4759-BD56-6B15F94B04E6}"/>
+              </a:ext>
+            </a:extLst>
+          </p:cNvPr>
+          <p:cNvSpPr txBox="1"/>
+          <p:nvPr/>
+        </p:nvSpPr>
+        <p:spPr>
+          <a:xfrm>
+            <a:off x="4311854" y="4031674"/>
+            <a:ext cx="3631534" cy="556951"/>
+          </a:xfrm>
+          <a:prstGeom prst="rect">
+            <a:avLst/>
+          </a:prstGeom>
+        </p:spPr>
+        <p:txBody>
+          <a:bodyPr vert="horz" wrap="square" lIns="91440" tIns="45720" rIns="91440" bIns="45720" rtlCol="0">
+            <a:noAutofit/>
+          </a:bodyPr>
+          <a:lstStyle/>
+          <a:p>
+            <a:pPr algn="ctr"/>
+            <a:r>
+              <a:rPr lang="es-ES" sz="3200" dirty="0"/>
+              <a:t>QA</a:t>
+            </a:r>
+            <a:endParaRPr lang="en-US" sz="3200" dirty="0"/>
+          </a:p>
+        </p:txBody>
+      </p:sp>
+      <p:sp>
+        <p:nvSpPr>
+          <p:cNvPr id="21" name="TextBox 20">
+            <a:extLst>
+              <a:ext uri="{FF2B5EF4-FFF2-40B4-BE49-F238E27FC236}">
+                <a16:creationId xmlns:a16="http://schemas.microsoft.com/office/drawing/2014/main" id="{C60DF88E-21D0-40E4-825F-F7C95ECE6D5A}"/>
+              </a:ext>
+            </a:extLst>
+          </p:cNvPr>
+          <p:cNvSpPr txBox="1"/>
+          <p:nvPr/>
+        </p:nvSpPr>
+        <p:spPr>
+          <a:xfrm>
+            <a:off x="274641" y="4031674"/>
+            <a:ext cx="3631534" cy="556951"/>
+          </a:xfrm>
+          <a:prstGeom prst="rect">
+            <a:avLst/>
+          </a:prstGeom>
+        </p:spPr>
+        <p:txBody>
+          <a:bodyPr vert="horz" wrap="square" lIns="91440" tIns="45720" rIns="91440" bIns="45720" rtlCol="0">
+            <a:noAutofit/>
+          </a:bodyPr>
+          <a:lstStyle/>
+          <a:p>
+            <a:pPr algn="ctr"/>
+            <a:r>
+              <a:rPr lang="es-ES" sz="3200" dirty="0"/>
+              <a:t>DEV</a:t>
+            </a:r>
+            <a:endParaRPr lang="en-US" sz="3200" dirty="0"/>
+          </a:p>
+        </p:txBody>
+      </p:sp>
+      <p:sp>
+        <p:nvSpPr>
+          <p:cNvPr id="22" name="TextBox 21">
+            <a:extLst>
+              <a:ext uri="{FF2B5EF4-FFF2-40B4-BE49-F238E27FC236}">
+                <a16:creationId xmlns:a16="http://schemas.microsoft.com/office/drawing/2014/main" id="{4F0AEEF0-5D42-4DF5-AB60-DFB19F4FBA9A}"/>
+              </a:ext>
+            </a:extLst>
+          </p:cNvPr>
+          <p:cNvSpPr txBox="1"/>
+          <p:nvPr/>
+        </p:nvSpPr>
+        <p:spPr>
+          <a:xfrm>
+            <a:off x="8349067" y="4031674"/>
+            <a:ext cx="3631534" cy="556951"/>
+          </a:xfrm>
+          <a:prstGeom prst="rect">
+            <a:avLst/>
+          </a:prstGeom>
+        </p:spPr>
+        <p:txBody>
+          <a:bodyPr vert="horz" wrap="square" lIns="91440" tIns="45720" rIns="91440" bIns="45720" rtlCol="0">
+            <a:normAutofit/>
+          </a:bodyPr>
+          <a:lstStyle/>
+          <a:p>
+            <a:pPr algn="ctr"/>
+            <a:r>
+              <a:rPr lang="es-ES" sz="2800" dirty="0"/>
+              <a:t>PROD</a:t>
+            </a:r>
+            <a:endParaRPr lang="en-US" sz="2800" dirty="0"/>
+          </a:p>
+        </p:txBody>
+      </p:sp>
+    </p:spTree>
+    <p:extLst>
+      <p:ext uri="{BB962C8B-B14F-4D97-AF65-F5344CB8AC3E}">
+        <p14:creationId xmlns:p14="http://schemas.microsoft.com/office/powerpoint/2010/main" val="2858387605"/>
       </p:ext>
     </p:extLst>
   </p:cSld>

</xml_diff>

<commit_message>
all slides added until demo slide
</commit_message>
<xml_diff>
--- a/slides/Despliegue continuo de tu infrastructura cloud con Azure ARM templates.pptx
+++ b/slides/Despliegue continuo de tu infrastructura cloud con Azure ARM templates.pptx
@@ -5,7 +5,7 @@
     <p:sldMasterId id="2147483670" r:id="rId2"/>
   </p:sldMasterIdLst>
   <p:notesMasterIdLst>
-    <p:notesMasterId r:id="rId14"/>
+    <p:notesMasterId r:id="rId18"/>
   </p:notesMasterIdLst>
   <p:sldIdLst>
     <p:sldId id="332" r:id="rId3"/>
@@ -17,8 +17,12 @@
     <p:sldId id="335" r:id="rId9"/>
     <p:sldId id="336" r:id="rId10"/>
     <p:sldId id="337" r:id="rId11"/>
-    <p:sldId id="295" r:id="rId12"/>
-    <p:sldId id="293" r:id="rId13"/>
+    <p:sldId id="338" r:id="rId12"/>
+    <p:sldId id="339" r:id="rId13"/>
+    <p:sldId id="340" r:id="rId14"/>
+    <p:sldId id="341" r:id="rId15"/>
+    <p:sldId id="295" r:id="rId16"/>
+    <p:sldId id="293" r:id="rId17"/>
   </p:sldIdLst>
   <p:sldSz cx="12192000" cy="6858000"/>
   <p:notesSz cx="6858000" cy="9144000"/>
@@ -139,6 +143,10 @@
             <p14:sldId id="335"/>
             <p14:sldId id="336"/>
             <p14:sldId id="337"/>
+            <p14:sldId id="338"/>
+            <p14:sldId id="339"/>
+            <p14:sldId id="340"/>
+            <p14:sldId id="341"/>
           </p14:sldIdLst>
         </p14:section>
         <p14:section name="Ending" id="{40438540-D5F8-47EC-B1E3-0407946D06ED}">
@@ -255,7 +263,7 @@
           <a:p>
             <a:fld id="{EC13577B-6902-467D-A26C-08A0DD5E4E03}" type="datetimeFigureOut">
               <a:rPr lang="en-US" smtClean="0"/>
-              <a:t>17-Apr-18</a:t>
+              <a:t>18-Apr-18</a:t>
             </a:fld>
             <a:endParaRPr lang="en-US"/>
           </a:p>
@@ -929,7 +937,7 @@
           <a:p>
             <a:fld id="{DF61EA0F-A667-4B49-8422-0062BC55E249}" type="slidenum">
               <a:rPr lang="en-US" smtClean="0"/>
-              <a:t>10</a:t>
+              <a:t>14</a:t>
             </a:fld>
             <a:endParaRPr lang="en-US"/>
           </a:p>
@@ -1013,7 +1021,7 @@
           <a:p>
             <a:fld id="{DF61EA0F-A667-4B49-8422-0062BC55E249}" type="slidenum">
               <a:rPr lang="en-US" smtClean="0"/>
-              <a:t>11</a:t>
+              <a:t>15</a:t>
             </a:fld>
             <a:endParaRPr lang="en-US"/>
           </a:p>
@@ -11271,7 +11279,7 @@
           <a:p>
             <a:fld id="{8BEEBAAA-29B5-4AF5-BC5F-7E580C29002D}" type="datetimeFigureOut">
               <a:rPr lang="en-US" smtClean="0"/>
-              <a:t>17-Apr-18</a:t>
+              <a:t>18-Apr-18</a:t>
             </a:fld>
             <a:endParaRPr lang="en-US"/>
           </a:p>
@@ -11785,6 +11793,1331 @@
           <a:chExt cx="0" cy="0"/>
         </a:xfrm>
       </p:grpSpPr>
+      <p:sp>
+        <p:nvSpPr>
+          <p:cNvPr id="3" name="Title 2">
+            <a:extLst>
+              <a:ext uri="{FF2B5EF4-FFF2-40B4-BE49-F238E27FC236}">
+                <a16:creationId xmlns:a16="http://schemas.microsoft.com/office/drawing/2014/main" id="{1AB88118-3C4F-497A-89A9-11D1CAEC39BC}"/>
+              </a:ext>
+            </a:extLst>
+          </p:cNvPr>
+          <p:cNvSpPr>
+            <a:spLocks noGrp="1"/>
+          </p:cNvSpPr>
+          <p:nvPr>
+            <p:ph type="title"/>
+          </p:nvPr>
+        </p:nvSpPr>
+        <p:spPr>
+          <a:xfrm>
+            <a:off x="274641" y="365125"/>
+            <a:ext cx="11079159" cy="1325563"/>
+          </a:xfrm>
+        </p:spPr>
+        <p:txBody>
+          <a:bodyPr/>
+          <a:lstStyle/>
+          <a:p>
+            <a:r>
+              <a:rPr lang="en-US" dirty="0"/>
+              <a:t>ARM Templates to rescue</a:t>
+            </a:r>
+          </a:p>
+        </p:txBody>
+      </p:sp>
+      <p:pic>
+        <p:nvPicPr>
+          <p:cNvPr id="5" name="Picture 4">
+            <a:extLst>
+              <a:ext uri="{FF2B5EF4-FFF2-40B4-BE49-F238E27FC236}">
+                <a16:creationId xmlns:a16="http://schemas.microsoft.com/office/drawing/2014/main" id="{34FA5048-23E2-47AC-AE9F-9861FBBE6170}"/>
+              </a:ext>
+            </a:extLst>
+          </p:cNvPr>
+          <p:cNvPicPr>
+            <a:picLocks noChangeAspect="1"/>
+          </p:cNvPicPr>
+          <p:nvPr/>
+        </p:nvPicPr>
+        <p:blipFill>
+          <a:blip r:embed="rId2"/>
+          <a:stretch>
+            <a:fillRect/>
+          </a:stretch>
+        </p:blipFill>
+        <p:spPr>
+          <a:xfrm>
+            <a:off x="8349067" y="1690687"/>
+            <a:ext cx="3631534" cy="2167803"/>
+          </a:xfrm>
+          <a:prstGeom prst="rect">
+            <a:avLst/>
+          </a:prstGeom>
+          <a:solidFill>
+            <a:srgbClr val="FFFFFF">
+              <a:shade val="85000"/>
+            </a:srgbClr>
+          </a:solidFill>
+          <a:ln w="88900" cap="sq">
+            <a:solidFill>
+              <a:srgbClr val="FFFFFF"/>
+            </a:solidFill>
+            <a:miter lim="800000"/>
+          </a:ln>
+          <a:effectLst>
+            <a:outerShdw blurRad="55000" dist="18000" dir="5400000" algn="tl" rotWithShape="0">
+              <a:srgbClr val="000000">
+                <a:alpha val="40000"/>
+              </a:srgbClr>
+            </a:outerShdw>
+          </a:effectLst>
+          <a:scene3d>
+            <a:camera prst="orthographicFront"/>
+            <a:lightRig rig="twoPt" dir="t">
+              <a:rot lat="0" lon="0" rev="7200000"/>
+            </a:lightRig>
+          </a:scene3d>
+          <a:sp3d>
+            <a:bevelT w="25400" h="19050"/>
+            <a:contourClr>
+              <a:srgbClr val="FFFFFF"/>
+            </a:contourClr>
+          </a:sp3d>
+        </p:spPr>
+      </p:pic>
+      <p:pic>
+        <p:nvPicPr>
+          <p:cNvPr id="4" name="Picture 3">
+            <a:extLst>
+              <a:ext uri="{FF2B5EF4-FFF2-40B4-BE49-F238E27FC236}">
+                <a16:creationId xmlns:a16="http://schemas.microsoft.com/office/drawing/2014/main" id="{DF563D7A-BC87-4596-BA17-CEBBE3E6EAD1}"/>
+              </a:ext>
+            </a:extLst>
+          </p:cNvPr>
+          <p:cNvPicPr>
+            <a:picLocks noChangeAspect="1"/>
+          </p:cNvPicPr>
+          <p:nvPr/>
+        </p:nvPicPr>
+        <p:blipFill>
+          <a:blip r:embed="rId2"/>
+          <a:stretch>
+            <a:fillRect/>
+          </a:stretch>
+        </p:blipFill>
+        <p:spPr>
+          <a:xfrm>
+            <a:off x="7136258" y="2669297"/>
+            <a:ext cx="3631534" cy="2167803"/>
+          </a:xfrm>
+          <a:prstGeom prst="rect">
+            <a:avLst/>
+          </a:prstGeom>
+          <a:solidFill>
+            <a:srgbClr val="FFFFFF">
+              <a:shade val="85000"/>
+            </a:srgbClr>
+          </a:solidFill>
+          <a:ln w="88900" cap="sq">
+            <a:solidFill>
+              <a:srgbClr val="FFFFFF"/>
+            </a:solidFill>
+            <a:miter lim="800000"/>
+          </a:ln>
+          <a:effectLst>
+            <a:outerShdw blurRad="55000" dist="18000" dir="5400000" algn="tl" rotWithShape="0">
+              <a:srgbClr val="000000">
+                <a:alpha val="40000"/>
+              </a:srgbClr>
+            </a:outerShdw>
+          </a:effectLst>
+          <a:scene3d>
+            <a:camera prst="orthographicFront"/>
+            <a:lightRig rig="twoPt" dir="t">
+              <a:rot lat="0" lon="0" rev="7200000"/>
+            </a:lightRig>
+          </a:scene3d>
+          <a:sp3d>
+            <a:bevelT w="25400" h="19050"/>
+            <a:contourClr>
+              <a:srgbClr val="FFFFFF"/>
+            </a:contourClr>
+          </a:sp3d>
+        </p:spPr>
+      </p:pic>
+      <p:sp>
+        <p:nvSpPr>
+          <p:cNvPr id="7" name="TextBox 6">
+            <a:extLst>
+              <a:ext uri="{FF2B5EF4-FFF2-40B4-BE49-F238E27FC236}">
+                <a16:creationId xmlns:a16="http://schemas.microsoft.com/office/drawing/2014/main" id="{86A4BAF7-B668-4759-BD56-6B15F94B04E6}"/>
+              </a:ext>
+            </a:extLst>
+          </p:cNvPr>
+          <p:cNvSpPr txBox="1"/>
+          <p:nvPr/>
+        </p:nvSpPr>
+        <p:spPr>
+          <a:xfrm>
+            <a:off x="9233210" y="4923692"/>
+            <a:ext cx="1534582" cy="556951"/>
+          </a:xfrm>
+          <a:prstGeom prst="rect">
+            <a:avLst/>
+          </a:prstGeom>
+        </p:spPr>
+        <p:txBody>
+          <a:bodyPr vert="horz" wrap="square" lIns="91440" tIns="45720" rIns="91440" bIns="45720" rtlCol="0">
+            <a:noAutofit/>
+          </a:bodyPr>
+          <a:lstStyle/>
+          <a:p>
+            <a:pPr algn="r"/>
+            <a:r>
+              <a:rPr lang="es-ES" sz="3200" dirty="0"/>
+              <a:t>QA</a:t>
+            </a:r>
+            <a:endParaRPr lang="en-US" sz="3200" dirty="0"/>
+          </a:p>
+        </p:txBody>
+      </p:sp>
+      <p:pic>
+        <p:nvPicPr>
+          <p:cNvPr id="2" name="Picture 1">
+            <a:extLst>
+              <a:ext uri="{FF2B5EF4-FFF2-40B4-BE49-F238E27FC236}">
+                <a16:creationId xmlns:a16="http://schemas.microsoft.com/office/drawing/2014/main" id="{CB9A3D82-3A4B-49A4-A9F1-9D9E0B168E1A}"/>
+              </a:ext>
+            </a:extLst>
+          </p:cNvPr>
+          <p:cNvPicPr>
+            <a:picLocks noChangeAspect="1"/>
+          </p:cNvPicPr>
+          <p:nvPr/>
+        </p:nvPicPr>
+        <p:blipFill>
+          <a:blip r:embed="rId2"/>
+          <a:stretch>
+            <a:fillRect/>
+          </a:stretch>
+        </p:blipFill>
+        <p:spPr>
+          <a:xfrm>
+            <a:off x="6265150" y="3974078"/>
+            <a:ext cx="3631534" cy="2167803"/>
+          </a:xfrm>
+          <a:prstGeom prst="rect">
+            <a:avLst/>
+          </a:prstGeom>
+          <a:solidFill>
+            <a:srgbClr val="FFFFFF">
+              <a:shade val="85000"/>
+            </a:srgbClr>
+          </a:solidFill>
+          <a:ln w="88900" cap="sq">
+            <a:solidFill>
+              <a:srgbClr val="FFFFFF"/>
+            </a:solidFill>
+            <a:miter lim="800000"/>
+          </a:ln>
+          <a:effectLst>
+            <a:outerShdw blurRad="55000" dist="18000" dir="5400000" algn="tl" rotWithShape="0">
+              <a:srgbClr val="000000">
+                <a:alpha val="40000"/>
+              </a:srgbClr>
+            </a:outerShdw>
+          </a:effectLst>
+          <a:scene3d>
+            <a:camera prst="orthographicFront"/>
+            <a:lightRig rig="twoPt" dir="t">
+              <a:rot lat="0" lon="0" rev="7200000"/>
+            </a:lightRig>
+          </a:scene3d>
+          <a:sp3d>
+            <a:bevelT w="25400" h="19050"/>
+            <a:contourClr>
+              <a:srgbClr val="FFFFFF"/>
+            </a:contourClr>
+          </a:sp3d>
+        </p:spPr>
+      </p:pic>
+      <p:sp>
+        <p:nvSpPr>
+          <p:cNvPr id="21" name="TextBox 20">
+            <a:extLst>
+              <a:ext uri="{FF2B5EF4-FFF2-40B4-BE49-F238E27FC236}">
+                <a16:creationId xmlns:a16="http://schemas.microsoft.com/office/drawing/2014/main" id="{C60DF88E-21D0-40E4-825F-F7C95ECE6D5A}"/>
+              </a:ext>
+            </a:extLst>
+          </p:cNvPr>
+          <p:cNvSpPr txBox="1"/>
+          <p:nvPr/>
+        </p:nvSpPr>
+        <p:spPr>
+          <a:xfrm>
+            <a:off x="8349066" y="6315065"/>
+            <a:ext cx="1547617" cy="556951"/>
+          </a:xfrm>
+          <a:prstGeom prst="rect">
+            <a:avLst/>
+          </a:prstGeom>
+        </p:spPr>
+        <p:txBody>
+          <a:bodyPr vert="horz" wrap="square" lIns="91440" tIns="45720" rIns="91440" bIns="45720" rtlCol="0">
+            <a:noAutofit/>
+          </a:bodyPr>
+          <a:lstStyle/>
+          <a:p>
+            <a:pPr algn="r"/>
+            <a:r>
+              <a:rPr lang="es-ES" sz="3200" dirty="0"/>
+              <a:t>DEV</a:t>
+            </a:r>
+            <a:endParaRPr lang="en-US" sz="3200" dirty="0"/>
+          </a:p>
+        </p:txBody>
+      </p:sp>
+      <p:sp>
+        <p:nvSpPr>
+          <p:cNvPr id="22" name="TextBox 21">
+            <a:extLst>
+              <a:ext uri="{FF2B5EF4-FFF2-40B4-BE49-F238E27FC236}">
+                <a16:creationId xmlns:a16="http://schemas.microsoft.com/office/drawing/2014/main" id="{4F0AEEF0-5D42-4DF5-AB60-DFB19F4FBA9A}"/>
+              </a:ext>
+            </a:extLst>
+          </p:cNvPr>
+          <p:cNvSpPr txBox="1"/>
+          <p:nvPr/>
+        </p:nvSpPr>
+        <p:spPr>
+          <a:xfrm>
+            <a:off x="9744796" y="3958378"/>
+            <a:ext cx="2235805" cy="556951"/>
+          </a:xfrm>
+          <a:prstGeom prst="rect">
+            <a:avLst/>
+          </a:prstGeom>
+        </p:spPr>
+        <p:txBody>
+          <a:bodyPr vert="horz" wrap="square" lIns="91440" tIns="45720" rIns="91440" bIns="45720" rtlCol="0">
+            <a:normAutofit/>
+          </a:bodyPr>
+          <a:lstStyle/>
+          <a:p>
+            <a:pPr algn="r"/>
+            <a:r>
+              <a:rPr lang="es-ES" sz="2800" dirty="0"/>
+              <a:t>PROD</a:t>
+            </a:r>
+            <a:endParaRPr lang="en-US" sz="2800" dirty="0"/>
+          </a:p>
+        </p:txBody>
+      </p:sp>
+      <p:pic>
+        <p:nvPicPr>
+          <p:cNvPr id="11" name="Picture 10">
+            <a:extLst>
+              <a:ext uri="{FF2B5EF4-FFF2-40B4-BE49-F238E27FC236}">
+                <a16:creationId xmlns:a16="http://schemas.microsoft.com/office/drawing/2014/main" id="{EB6B9E15-F341-4B0A-BCD4-0ACC5E86E23A}"/>
+              </a:ext>
+            </a:extLst>
+          </p:cNvPr>
+          <p:cNvPicPr>
+            <a:picLocks noChangeAspect="1"/>
+          </p:cNvPicPr>
+          <p:nvPr/>
+        </p:nvPicPr>
+        <p:blipFill>
+          <a:blip r:embed="rId3"/>
+          <a:stretch>
+            <a:fillRect/>
+          </a:stretch>
+        </p:blipFill>
+        <p:spPr>
+          <a:xfrm>
+            <a:off x="1601715" y="2686929"/>
+            <a:ext cx="2368041" cy="3196110"/>
+          </a:xfrm>
+          <a:prstGeom prst="rect">
+            <a:avLst/>
+          </a:prstGeom>
+          <a:solidFill>
+            <a:srgbClr val="FFFFFF">
+              <a:shade val="85000"/>
+            </a:srgbClr>
+          </a:solidFill>
+          <a:ln w="88900" cap="sq">
+            <a:solidFill>
+              <a:srgbClr val="FFFFFF"/>
+            </a:solidFill>
+            <a:miter lim="800000"/>
+          </a:ln>
+          <a:effectLst>
+            <a:outerShdw blurRad="55000" dist="18000" dir="5400000" algn="tl" rotWithShape="0">
+              <a:srgbClr val="000000">
+                <a:alpha val="40000"/>
+              </a:srgbClr>
+            </a:outerShdw>
+          </a:effectLst>
+          <a:scene3d>
+            <a:camera prst="orthographicFront"/>
+            <a:lightRig rig="twoPt" dir="t">
+              <a:rot lat="0" lon="0" rev="7200000"/>
+            </a:lightRig>
+          </a:scene3d>
+          <a:sp3d>
+            <a:bevelT w="25400" h="19050"/>
+            <a:contourClr>
+              <a:srgbClr val="FFFFFF"/>
+            </a:contourClr>
+          </a:sp3d>
+        </p:spPr>
+      </p:pic>
+      <p:pic>
+        <p:nvPicPr>
+          <p:cNvPr id="1026" name="Picture 2" descr="Image result for azure resource group logo">
+            <a:extLst>
+              <a:ext uri="{FF2B5EF4-FFF2-40B4-BE49-F238E27FC236}">
+                <a16:creationId xmlns:a16="http://schemas.microsoft.com/office/drawing/2014/main" id="{F3D78C02-DB3A-4C61-8FD7-7E1EE45C3009}"/>
+              </a:ext>
+            </a:extLst>
+          </p:cNvPr>
+          <p:cNvPicPr>
+            <a:picLocks noChangeAspect="1" noChangeArrowheads="1"/>
+          </p:cNvPicPr>
+          <p:nvPr/>
+        </p:nvPicPr>
+        <p:blipFill>
+          <a:blip r:embed="rId4" cstate="print">
+            <a:extLst>
+              <a:ext uri="{28A0092B-C50C-407E-A947-70E740481C1C}">
+                <a14:useLocalDpi xmlns:a14="http://schemas.microsoft.com/office/drawing/2010/main" val="0"/>
+              </a:ext>
+            </a:extLst>
+          </a:blip>
+          <a:srcRect/>
+          <a:stretch>
+            <a:fillRect/>
+          </a:stretch>
+        </p:blipFill>
+        <p:spPr bwMode="auto">
+          <a:xfrm>
+            <a:off x="2293395" y="1780440"/>
+            <a:ext cx="984679" cy="799105"/>
+          </a:xfrm>
+          <a:prstGeom prst="rect">
+            <a:avLst/>
+          </a:prstGeom>
+          <a:noFill/>
+          <a:extLst>
+            <a:ext uri="{909E8E84-426E-40DD-AFC4-6F175D3DCCD1}">
+              <a14:hiddenFill xmlns:a14="http://schemas.microsoft.com/office/drawing/2010/main">
+                <a:solidFill>
+                  <a:srgbClr val="FFFFFF"/>
+                </a:solidFill>
+              </a14:hiddenFill>
+            </a:ext>
+          </a:extLst>
+        </p:spPr>
+      </p:pic>
+      <p:sp>
+        <p:nvSpPr>
+          <p:cNvPr id="15" name="Arrow: Bent 14">
+            <a:extLst>
+              <a:ext uri="{FF2B5EF4-FFF2-40B4-BE49-F238E27FC236}">
+                <a16:creationId xmlns:a16="http://schemas.microsoft.com/office/drawing/2014/main" id="{60F1B16F-F526-48F9-8232-8FDB1F620837}"/>
+              </a:ext>
+            </a:extLst>
+          </p:cNvPr>
+          <p:cNvSpPr/>
+          <p:nvPr/>
+        </p:nvSpPr>
+        <p:spPr bwMode="black">
+          <a:xfrm>
+            <a:off x="4327310" y="1578960"/>
+            <a:ext cx="3844303" cy="1926225"/>
+          </a:xfrm>
+          <a:prstGeom prst="bentArrow">
+            <a:avLst>
+              <a:gd name="adj1" fmla="val 19442"/>
+              <a:gd name="adj2" fmla="val 20253"/>
+              <a:gd name="adj3" fmla="val 25000"/>
+              <a:gd name="adj4" fmla="val 36571"/>
+            </a:avLst>
+          </a:prstGeom>
+          <a:solidFill>
+            <a:schemeClr val="accent2"/>
+          </a:solidFill>
+          <a:ln>
+            <a:noFill/>
+          </a:ln>
+          <a:extLst/>
+        </p:spPr>
+        <p:txBody>
+          <a:bodyPr vert="horz" wrap="square" lIns="82305" tIns="41153" rIns="82305" bIns="41153" numCol="1" rtlCol="0" anchor="t" anchorCtr="0" compatLnSpc="1">
+            <a:prstTxWarp prst="textNoShape">
+              <a:avLst/>
+            </a:prstTxWarp>
+          </a:bodyPr>
+          <a:lstStyle/>
+          <a:p>
+            <a:pPr algn="ctr" defTabSz="1218987"/>
+            <a:endParaRPr lang="en-US" sz="1600">
+              <a:solidFill>
+                <a:srgbClr val="292929"/>
+              </a:solidFill>
+            </a:endParaRPr>
+          </a:p>
+        </p:txBody>
+      </p:sp>
+      <p:sp>
+        <p:nvSpPr>
+          <p:cNvPr id="24" name="Arrow: Bent 23">
+            <a:extLst>
+              <a:ext uri="{FF2B5EF4-FFF2-40B4-BE49-F238E27FC236}">
+                <a16:creationId xmlns:a16="http://schemas.microsoft.com/office/drawing/2014/main" id="{9C3083C5-619F-4C22-AD1D-EBC5CEA9E049}"/>
+              </a:ext>
+            </a:extLst>
+          </p:cNvPr>
+          <p:cNvSpPr/>
+          <p:nvPr/>
+        </p:nvSpPr>
+        <p:spPr bwMode="black">
+          <a:xfrm rot="10800000" flipH="1">
+            <a:off x="4327311" y="3506916"/>
+            <a:ext cx="1850466" cy="1926225"/>
+          </a:xfrm>
+          <a:prstGeom prst="bentArrow">
+            <a:avLst>
+              <a:gd name="adj1" fmla="val 20165"/>
+              <a:gd name="adj2" fmla="val 20253"/>
+              <a:gd name="adj3" fmla="val 25000"/>
+              <a:gd name="adj4" fmla="val 36571"/>
+            </a:avLst>
+          </a:prstGeom>
+          <a:solidFill>
+            <a:schemeClr val="accent2"/>
+          </a:solidFill>
+          <a:ln>
+            <a:noFill/>
+          </a:ln>
+          <a:extLst/>
+        </p:spPr>
+        <p:txBody>
+          <a:bodyPr vert="horz" wrap="square" lIns="82305" tIns="41153" rIns="82305" bIns="41153" numCol="1" rtlCol="0" anchor="t" anchorCtr="0" compatLnSpc="1">
+            <a:prstTxWarp prst="textNoShape">
+              <a:avLst/>
+            </a:prstTxWarp>
+          </a:bodyPr>
+          <a:lstStyle/>
+          <a:p>
+            <a:pPr algn="ctr" defTabSz="1218987"/>
+            <a:endParaRPr lang="en-US" sz="1600">
+              <a:solidFill>
+                <a:srgbClr val="292929"/>
+              </a:solidFill>
+            </a:endParaRPr>
+          </a:p>
+        </p:txBody>
+      </p:sp>
+      <p:sp>
+        <p:nvSpPr>
+          <p:cNvPr id="20" name="Arrow: Right 19">
+            <a:extLst>
+              <a:ext uri="{FF2B5EF4-FFF2-40B4-BE49-F238E27FC236}">
+                <a16:creationId xmlns:a16="http://schemas.microsoft.com/office/drawing/2014/main" id="{427A1A0F-327D-4A61-B0DF-49AA7A31D30C}"/>
+              </a:ext>
+            </a:extLst>
+          </p:cNvPr>
+          <p:cNvSpPr/>
+          <p:nvPr/>
+        </p:nvSpPr>
+        <p:spPr bwMode="black">
+          <a:xfrm>
+            <a:off x="4643368" y="3162486"/>
+            <a:ext cx="2368041" cy="584324"/>
+          </a:xfrm>
+          <a:prstGeom prst="rightArrow">
+            <a:avLst>
+              <a:gd name="adj1" fmla="val 62214"/>
+              <a:gd name="adj2" fmla="val 58397"/>
+            </a:avLst>
+          </a:prstGeom>
+          <a:solidFill>
+            <a:schemeClr val="accent2"/>
+          </a:solidFill>
+          <a:ln>
+            <a:noFill/>
+          </a:ln>
+          <a:extLst/>
+        </p:spPr>
+        <p:txBody>
+          <a:bodyPr vert="horz" wrap="square" lIns="82305" tIns="41153" rIns="82305" bIns="41153" numCol="1" rtlCol="0" anchor="t" anchorCtr="0" compatLnSpc="1">
+            <a:prstTxWarp prst="textNoShape">
+              <a:avLst/>
+            </a:prstTxWarp>
+          </a:bodyPr>
+          <a:lstStyle/>
+          <a:p>
+            <a:pPr algn="ctr" defTabSz="1218987"/>
+            <a:endParaRPr lang="en-US" sz="1600">
+              <a:solidFill>
+                <a:srgbClr val="292929"/>
+              </a:solidFill>
+            </a:endParaRPr>
+          </a:p>
+        </p:txBody>
+      </p:sp>
+    </p:spTree>
+    <p:extLst>
+      <p:ext uri="{BB962C8B-B14F-4D97-AF65-F5344CB8AC3E}">
+        <p14:creationId xmlns:p14="http://schemas.microsoft.com/office/powerpoint/2010/main" val="621219887"/>
+      </p:ext>
+    </p:extLst>
+  </p:cSld>
+  <p:clrMapOvr>
+    <a:masterClrMapping/>
+  </p:clrMapOvr>
+</p:sld>
+</file>
+
+<file path=ppt/slides/slide11.xml><?xml version="1.0" encoding="utf-8"?>
+<p:sld xmlns:a="http://schemas.openxmlformats.org/drawingml/2006/main" xmlns:r="http://schemas.openxmlformats.org/officeDocument/2006/relationships" xmlns:p="http://schemas.openxmlformats.org/presentationml/2006/main">
+  <p:cSld>
+    <p:spTree>
+      <p:nvGrpSpPr>
+        <p:cNvPr id="1" name=""/>
+        <p:cNvGrpSpPr/>
+        <p:nvPr/>
+      </p:nvGrpSpPr>
+      <p:grpSpPr>
+        <a:xfrm>
+          <a:off x="0" y="0"/>
+          <a:ext cx="0" cy="0"/>
+          <a:chOff x="0" y="0"/>
+          <a:chExt cx="0" cy="0"/>
+        </a:xfrm>
+      </p:grpSpPr>
+      <p:sp>
+        <p:nvSpPr>
+          <p:cNvPr id="2" name="Text Placeholder 1">
+            <a:extLst>
+              <a:ext uri="{FF2B5EF4-FFF2-40B4-BE49-F238E27FC236}">
+                <a16:creationId xmlns:a16="http://schemas.microsoft.com/office/drawing/2014/main" id="{24228185-43F1-4B59-8747-6DFB0C832E28}"/>
+              </a:ext>
+            </a:extLst>
+          </p:cNvPr>
+          <p:cNvSpPr>
+            <a:spLocks noGrp="1"/>
+          </p:cNvSpPr>
+          <p:nvPr>
+            <p:ph type="body" sz="quarter" idx="11"/>
+          </p:nvPr>
+        </p:nvSpPr>
+        <p:spPr/>
+        <p:txBody>
+          <a:bodyPr/>
+          <a:lstStyle/>
+          <a:p>
+            <a:r>
+              <a:rPr lang="en-US" dirty="0"/>
+              <a:t>Azure ARM template anatomy</a:t>
+            </a:r>
+          </a:p>
+        </p:txBody>
+      </p:sp>
+    </p:spTree>
+    <p:extLst>
+      <p:ext uri="{BB962C8B-B14F-4D97-AF65-F5344CB8AC3E}">
+        <p14:creationId xmlns:p14="http://schemas.microsoft.com/office/powerpoint/2010/main" val="1989567444"/>
+      </p:ext>
+    </p:extLst>
+  </p:cSld>
+  <p:clrMapOvr>
+    <a:masterClrMapping/>
+  </p:clrMapOvr>
+</p:sld>
+</file>
+
+<file path=ppt/slides/slide12.xml><?xml version="1.0" encoding="utf-8"?>
+<p:sld xmlns:a="http://schemas.openxmlformats.org/drawingml/2006/main" xmlns:r="http://schemas.openxmlformats.org/officeDocument/2006/relationships" xmlns:p="http://schemas.openxmlformats.org/presentationml/2006/main">
+  <p:cSld>
+    <p:spTree>
+      <p:nvGrpSpPr>
+        <p:cNvPr id="1" name=""/>
+        <p:cNvGrpSpPr/>
+        <p:nvPr/>
+      </p:nvGrpSpPr>
+      <p:grpSpPr>
+        <a:xfrm>
+          <a:off x="0" y="0"/>
+          <a:ext cx="0" cy="0"/>
+          <a:chOff x="0" y="0"/>
+          <a:chExt cx="0" cy="0"/>
+        </a:xfrm>
+      </p:grpSpPr>
+      <p:sp>
+        <p:nvSpPr>
+          <p:cNvPr id="3" name="Title 2">
+            <a:extLst>
+              <a:ext uri="{FF2B5EF4-FFF2-40B4-BE49-F238E27FC236}">
+                <a16:creationId xmlns:a16="http://schemas.microsoft.com/office/drawing/2014/main" id="{ADC2436C-7A18-45DC-BBA3-1936A5865160}"/>
+              </a:ext>
+            </a:extLst>
+          </p:cNvPr>
+          <p:cNvSpPr>
+            <a:spLocks noGrp="1"/>
+          </p:cNvSpPr>
+          <p:nvPr>
+            <p:ph type="title"/>
+          </p:nvPr>
+        </p:nvSpPr>
+        <p:spPr/>
+        <p:txBody>
+          <a:bodyPr/>
+          <a:lstStyle/>
+          <a:p>
+            <a:r>
+              <a:rPr lang="es-ES" dirty="0"/>
+              <a:t>ARM </a:t>
+            </a:r>
+            <a:r>
+              <a:rPr lang="es-ES" dirty="0" err="1"/>
+              <a:t>Template</a:t>
+            </a:r>
+            <a:r>
+              <a:rPr lang="es-ES" dirty="0"/>
+              <a:t> </a:t>
+            </a:r>
+            <a:r>
+              <a:rPr lang="es-ES" dirty="0" err="1"/>
+              <a:t>Anatomy</a:t>
+            </a:r>
+            <a:endParaRPr lang="en-US" dirty="0"/>
+          </a:p>
+        </p:txBody>
+      </p:sp>
+      <p:sp>
+        <p:nvSpPr>
+          <p:cNvPr id="6" name="Plus Sign 5">
+            <a:extLst>
+              <a:ext uri="{FF2B5EF4-FFF2-40B4-BE49-F238E27FC236}">
+                <a16:creationId xmlns:a16="http://schemas.microsoft.com/office/drawing/2014/main" id="{DF1980C2-8336-4433-9EEE-0F0DDF119A46}"/>
+              </a:ext>
+            </a:extLst>
+          </p:cNvPr>
+          <p:cNvSpPr/>
+          <p:nvPr/>
+        </p:nvSpPr>
+        <p:spPr bwMode="black">
+          <a:xfrm>
+            <a:off x="2395307" y="3653134"/>
+            <a:ext cx="891331" cy="918864"/>
+          </a:xfrm>
+          <a:prstGeom prst="mathPlus">
+            <a:avLst/>
+          </a:prstGeom>
+          <a:solidFill>
+            <a:srgbClr val="AEB785"/>
+          </a:solidFill>
+          <a:ln>
+            <a:noFill/>
+          </a:ln>
+          <a:extLst/>
+        </p:spPr>
+        <p:txBody>
+          <a:bodyPr vert="horz" wrap="square" lIns="82305" tIns="41153" rIns="82305" bIns="41153" numCol="1" rtlCol="0" anchor="t" anchorCtr="0" compatLnSpc="1">
+            <a:prstTxWarp prst="textNoShape">
+              <a:avLst/>
+            </a:prstTxWarp>
+          </a:bodyPr>
+          <a:lstStyle/>
+          <a:p>
+            <a:pPr algn="ctr" defTabSz="1218987"/>
+            <a:endParaRPr lang="en-US" sz="1600">
+              <a:solidFill>
+                <a:srgbClr val="292929"/>
+              </a:solidFill>
+            </a:endParaRPr>
+          </a:p>
+        </p:txBody>
+      </p:sp>
+      <p:pic>
+        <p:nvPicPr>
+          <p:cNvPr id="7" name="Picture 6">
+            <a:extLst>
+              <a:ext uri="{FF2B5EF4-FFF2-40B4-BE49-F238E27FC236}">
+                <a16:creationId xmlns:a16="http://schemas.microsoft.com/office/drawing/2014/main" id="{2AC17C5B-B62F-4232-B265-ADDD88971661}"/>
+              </a:ext>
+            </a:extLst>
+          </p:cNvPr>
+          <p:cNvPicPr>
+            <a:picLocks noChangeAspect="1"/>
+          </p:cNvPicPr>
+          <p:nvPr/>
+        </p:nvPicPr>
+        <p:blipFill>
+          <a:blip r:embed="rId2"/>
+          <a:stretch>
+            <a:fillRect/>
+          </a:stretch>
+        </p:blipFill>
+        <p:spPr>
+          <a:xfrm>
+            <a:off x="392934" y="2640608"/>
+            <a:ext cx="1986206" cy="2680753"/>
+          </a:xfrm>
+          <a:prstGeom prst="snip2DiagRect">
+            <a:avLst/>
+          </a:prstGeom>
+          <a:solidFill>
+            <a:srgbClr val="FFFFFF">
+              <a:shade val="85000"/>
+            </a:srgbClr>
+          </a:solidFill>
+          <a:ln w="88900" cap="sq">
+            <a:solidFill>
+              <a:srgbClr val="FFFFFF"/>
+            </a:solidFill>
+            <a:miter lim="800000"/>
+          </a:ln>
+          <a:effectLst>
+            <a:outerShdw blurRad="88900" algn="tl" rotWithShape="0">
+              <a:srgbClr val="000000">
+                <a:alpha val="45000"/>
+              </a:srgbClr>
+            </a:outerShdw>
+          </a:effectLst>
+          <a:scene3d>
+            <a:camera prst="orthographicFront"/>
+            <a:lightRig rig="twoPt" dir="t">
+              <a:rot lat="0" lon="0" rev="7200000"/>
+            </a:lightRig>
+          </a:scene3d>
+          <a:sp3d>
+            <a:bevelT w="25400" h="19050"/>
+            <a:contourClr>
+              <a:srgbClr val="FFFFFF"/>
+            </a:contourClr>
+          </a:sp3d>
+        </p:spPr>
+      </p:pic>
+      <p:pic>
+        <p:nvPicPr>
+          <p:cNvPr id="8" name="Picture 7">
+            <a:extLst>
+              <a:ext uri="{FF2B5EF4-FFF2-40B4-BE49-F238E27FC236}">
+                <a16:creationId xmlns:a16="http://schemas.microsoft.com/office/drawing/2014/main" id="{ED642BBC-D443-474F-BE59-B1107DCFBC51}"/>
+              </a:ext>
+            </a:extLst>
+          </p:cNvPr>
+          <p:cNvPicPr>
+            <a:picLocks noChangeAspect="1"/>
+          </p:cNvPicPr>
+          <p:nvPr/>
+        </p:nvPicPr>
+        <p:blipFill>
+          <a:blip r:embed="rId3"/>
+          <a:stretch>
+            <a:fillRect/>
+          </a:stretch>
+        </p:blipFill>
+        <p:spPr>
+          <a:xfrm>
+            <a:off x="3290178" y="3341001"/>
+            <a:ext cx="1786457" cy="1534315"/>
+          </a:xfrm>
+          <a:prstGeom prst="snip2DiagRect">
+            <a:avLst/>
+          </a:prstGeom>
+          <a:solidFill>
+            <a:srgbClr val="FFFFFF">
+              <a:shade val="85000"/>
+            </a:srgbClr>
+          </a:solidFill>
+          <a:ln w="88900" cap="sq">
+            <a:solidFill>
+              <a:srgbClr val="FFFFFF"/>
+            </a:solidFill>
+            <a:miter lim="800000"/>
+          </a:ln>
+          <a:effectLst>
+            <a:outerShdw blurRad="88900" algn="tl" rotWithShape="0">
+              <a:srgbClr val="000000">
+                <a:alpha val="45000"/>
+              </a:srgbClr>
+            </a:outerShdw>
+          </a:effectLst>
+          <a:scene3d>
+            <a:camera prst="orthographicFront"/>
+            <a:lightRig rig="twoPt" dir="t">
+              <a:rot lat="0" lon="0" rev="7200000"/>
+            </a:lightRig>
+          </a:scene3d>
+          <a:sp3d>
+            <a:bevelT w="25400" h="19050"/>
+            <a:contourClr>
+              <a:srgbClr val="FFFFFF"/>
+            </a:contourClr>
+          </a:sp3d>
+        </p:spPr>
+      </p:pic>
+      <p:sp>
+        <p:nvSpPr>
+          <p:cNvPr id="9" name="TextBox 8">
+            <a:extLst>
+              <a:ext uri="{FF2B5EF4-FFF2-40B4-BE49-F238E27FC236}">
+                <a16:creationId xmlns:a16="http://schemas.microsoft.com/office/drawing/2014/main" id="{D90ACA07-65FE-4A89-B087-7F4E7BFFE24D}"/>
+              </a:ext>
+            </a:extLst>
+          </p:cNvPr>
+          <p:cNvSpPr txBox="1"/>
+          <p:nvPr/>
+        </p:nvSpPr>
+        <p:spPr>
+          <a:xfrm>
+            <a:off x="339011" y="2274846"/>
+            <a:ext cx="2040130" cy="303313"/>
+          </a:xfrm>
+          <a:prstGeom prst="rect">
+            <a:avLst/>
+          </a:prstGeom>
+        </p:spPr>
+        <p:txBody>
+          <a:bodyPr vert="horz" wrap="square" lIns="91440" tIns="45720" rIns="91440" bIns="45720" rtlCol="0">
+            <a:normAutofit fontScale="85000" lnSpcReduction="10000"/>
+          </a:bodyPr>
+          <a:lstStyle/>
+          <a:p>
+            <a:pPr algn="ctr"/>
+            <a:r>
+              <a:rPr lang="es-ES" dirty="0" err="1"/>
+              <a:t>Template</a:t>
+            </a:r>
+            <a:r>
+              <a:rPr lang="es-ES" dirty="0"/>
+              <a:t> JSON</a:t>
+            </a:r>
+            <a:endParaRPr lang="en-US" dirty="0"/>
+          </a:p>
+        </p:txBody>
+      </p:sp>
+      <p:sp>
+        <p:nvSpPr>
+          <p:cNvPr id="10" name="TextBox 9">
+            <a:extLst>
+              <a:ext uri="{FF2B5EF4-FFF2-40B4-BE49-F238E27FC236}">
+                <a16:creationId xmlns:a16="http://schemas.microsoft.com/office/drawing/2014/main" id="{F558A92A-F7AD-45F8-A73E-CF9907A2E95D}"/>
+              </a:ext>
+            </a:extLst>
+          </p:cNvPr>
+          <p:cNvSpPr txBox="1"/>
+          <p:nvPr/>
+        </p:nvSpPr>
+        <p:spPr>
+          <a:xfrm>
+            <a:off x="3207115" y="3005257"/>
+            <a:ext cx="1949234" cy="303313"/>
+          </a:xfrm>
+          <a:prstGeom prst="rect">
+            <a:avLst/>
+          </a:prstGeom>
+        </p:spPr>
+        <p:txBody>
+          <a:bodyPr vert="horz" wrap="square" lIns="91440" tIns="45720" rIns="91440" bIns="45720" rtlCol="0">
+            <a:normAutofit fontScale="85000" lnSpcReduction="10000"/>
+          </a:bodyPr>
+          <a:lstStyle/>
+          <a:p>
+            <a:pPr algn="ctr"/>
+            <a:r>
+              <a:rPr lang="es-ES" dirty="0" err="1"/>
+              <a:t>Parameters</a:t>
+            </a:r>
+            <a:r>
+              <a:rPr lang="es-ES" dirty="0"/>
+              <a:t> JSON</a:t>
+            </a:r>
+            <a:endParaRPr lang="en-US" dirty="0"/>
+          </a:p>
+        </p:txBody>
+      </p:sp>
+      <p:sp>
+        <p:nvSpPr>
+          <p:cNvPr id="11" name="Plus Sign 10">
+            <a:extLst>
+              <a:ext uri="{FF2B5EF4-FFF2-40B4-BE49-F238E27FC236}">
+                <a16:creationId xmlns:a16="http://schemas.microsoft.com/office/drawing/2014/main" id="{F218BFB5-8F6E-4B17-BE64-CC3866C32991}"/>
+              </a:ext>
+            </a:extLst>
+          </p:cNvPr>
+          <p:cNvSpPr/>
+          <p:nvPr/>
+        </p:nvSpPr>
+        <p:spPr bwMode="black">
+          <a:xfrm>
+            <a:off x="5103572" y="3653133"/>
+            <a:ext cx="891331" cy="918864"/>
+          </a:xfrm>
+          <a:prstGeom prst="mathPlus">
+            <a:avLst/>
+          </a:prstGeom>
+          <a:solidFill>
+            <a:srgbClr val="AEB785"/>
+          </a:solidFill>
+          <a:ln>
+            <a:noFill/>
+          </a:ln>
+          <a:extLst/>
+        </p:spPr>
+        <p:txBody>
+          <a:bodyPr vert="horz" wrap="square" lIns="82305" tIns="41153" rIns="82305" bIns="41153" numCol="1" rtlCol="0" anchor="t" anchorCtr="0" compatLnSpc="1">
+            <a:prstTxWarp prst="textNoShape">
+              <a:avLst/>
+            </a:prstTxWarp>
+          </a:bodyPr>
+          <a:lstStyle/>
+          <a:p>
+            <a:pPr algn="ctr" defTabSz="1218987"/>
+            <a:endParaRPr lang="en-US" sz="1600">
+              <a:solidFill>
+                <a:srgbClr val="292929"/>
+              </a:solidFill>
+            </a:endParaRPr>
+          </a:p>
+        </p:txBody>
+      </p:sp>
+      <p:sp>
+        <p:nvSpPr>
+          <p:cNvPr id="12" name="Rectangle: Diagonal Corners Snipped 11">
+            <a:extLst>
+              <a:ext uri="{FF2B5EF4-FFF2-40B4-BE49-F238E27FC236}">
+                <a16:creationId xmlns:a16="http://schemas.microsoft.com/office/drawing/2014/main" id="{F60C7E32-78A0-41E8-8923-6315BBB1B4C4}"/>
+              </a:ext>
+            </a:extLst>
+          </p:cNvPr>
+          <p:cNvSpPr/>
+          <p:nvPr/>
+        </p:nvSpPr>
+        <p:spPr bwMode="black">
+          <a:xfrm>
+            <a:off x="6013682" y="2894861"/>
+            <a:ext cx="1608932" cy="524736"/>
+          </a:xfrm>
+          <a:prstGeom prst="snip2DiagRect">
+            <a:avLst/>
+          </a:prstGeom>
+          <a:solidFill>
+            <a:schemeClr val="accent2"/>
+          </a:solidFill>
+          <a:ln>
+            <a:noFill/>
+          </a:ln>
+          <a:extLst/>
+        </p:spPr>
+        <p:txBody>
+          <a:bodyPr vert="horz" wrap="square" lIns="82305" tIns="41153" rIns="82305" bIns="41153" numCol="1" rtlCol="0" anchor="t" anchorCtr="0" compatLnSpc="1">
+            <a:prstTxWarp prst="textNoShape">
+              <a:avLst/>
+            </a:prstTxWarp>
+          </a:bodyPr>
+          <a:lstStyle/>
+          <a:p>
+            <a:pPr algn="ctr" defTabSz="1218987"/>
+            <a:r>
+              <a:rPr lang="es-ES" sz="1600" dirty="0" err="1">
+                <a:solidFill>
+                  <a:srgbClr val="292929"/>
+                </a:solidFill>
+              </a:rPr>
+              <a:t>Power</a:t>
+            </a:r>
+            <a:r>
+              <a:rPr lang="es-ES" sz="1600" dirty="0">
+                <a:solidFill>
+                  <a:srgbClr val="292929"/>
+                </a:solidFill>
+              </a:rPr>
+              <a:t> Shell</a:t>
+            </a:r>
+            <a:endParaRPr lang="en-US" sz="1600" dirty="0">
+              <a:solidFill>
+                <a:srgbClr val="292929"/>
+              </a:solidFill>
+            </a:endParaRPr>
+          </a:p>
+        </p:txBody>
+      </p:sp>
+      <p:sp>
+        <p:nvSpPr>
+          <p:cNvPr id="13" name="Rectangle: Diagonal Corners Snipped 12">
+            <a:extLst>
+              <a:ext uri="{FF2B5EF4-FFF2-40B4-BE49-F238E27FC236}">
+                <a16:creationId xmlns:a16="http://schemas.microsoft.com/office/drawing/2014/main" id="{22D53929-5A22-4F59-80E4-65A5143F1B50}"/>
+              </a:ext>
+            </a:extLst>
+          </p:cNvPr>
+          <p:cNvSpPr/>
+          <p:nvPr/>
+        </p:nvSpPr>
+        <p:spPr bwMode="black">
+          <a:xfrm>
+            <a:off x="6013682" y="3723397"/>
+            <a:ext cx="1608932" cy="524736"/>
+          </a:xfrm>
+          <a:prstGeom prst="snip2DiagRect">
+            <a:avLst/>
+          </a:prstGeom>
+          <a:solidFill>
+            <a:schemeClr val="accent2"/>
+          </a:solidFill>
+          <a:ln>
+            <a:noFill/>
+          </a:ln>
+          <a:extLst/>
+        </p:spPr>
+        <p:txBody>
+          <a:bodyPr vert="horz" wrap="square" lIns="82305" tIns="41153" rIns="82305" bIns="41153" numCol="1" rtlCol="0" anchor="t" anchorCtr="0" compatLnSpc="1">
+            <a:prstTxWarp prst="textNoShape">
+              <a:avLst/>
+            </a:prstTxWarp>
+          </a:bodyPr>
+          <a:lstStyle/>
+          <a:p>
+            <a:pPr algn="ctr" defTabSz="1218987"/>
+            <a:r>
+              <a:rPr lang="es-ES" sz="1600" dirty="0">
+                <a:solidFill>
+                  <a:srgbClr val="292929"/>
+                </a:solidFill>
+              </a:rPr>
+              <a:t>CLI</a:t>
+            </a:r>
+            <a:endParaRPr lang="en-US" sz="1600" dirty="0">
+              <a:solidFill>
+                <a:srgbClr val="292929"/>
+              </a:solidFill>
+            </a:endParaRPr>
+          </a:p>
+        </p:txBody>
+      </p:sp>
+      <p:sp>
+        <p:nvSpPr>
+          <p:cNvPr id="14" name="Rectangle: Diagonal Corners Snipped 13">
+            <a:extLst>
+              <a:ext uri="{FF2B5EF4-FFF2-40B4-BE49-F238E27FC236}">
+                <a16:creationId xmlns:a16="http://schemas.microsoft.com/office/drawing/2014/main" id="{BE842DEA-A7E3-47A1-B756-71124DE80C3C}"/>
+              </a:ext>
+            </a:extLst>
+          </p:cNvPr>
+          <p:cNvSpPr/>
+          <p:nvPr/>
+        </p:nvSpPr>
+        <p:spPr bwMode="black">
+          <a:xfrm>
+            <a:off x="6045281" y="4551933"/>
+            <a:ext cx="1608932" cy="524736"/>
+          </a:xfrm>
+          <a:prstGeom prst="snip2DiagRect">
+            <a:avLst/>
+          </a:prstGeom>
+          <a:solidFill>
+            <a:schemeClr val="accent2"/>
+          </a:solidFill>
+          <a:ln>
+            <a:noFill/>
+          </a:ln>
+          <a:extLst/>
+        </p:spPr>
+        <p:txBody>
+          <a:bodyPr vert="horz" wrap="square" lIns="82305" tIns="41153" rIns="82305" bIns="41153" numCol="1" rtlCol="0" anchor="t" anchorCtr="0" compatLnSpc="1">
+            <a:prstTxWarp prst="textNoShape">
+              <a:avLst/>
+            </a:prstTxWarp>
+          </a:bodyPr>
+          <a:lstStyle/>
+          <a:p>
+            <a:pPr algn="ctr" defTabSz="1218987"/>
+            <a:r>
+              <a:rPr lang="es-ES" sz="1600" dirty="0">
+                <a:solidFill>
+                  <a:srgbClr val="292929"/>
+                </a:solidFill>
+              </a:rPr>
+              <a:t>API</a:t>
+            </a:r>
+            <a:endParaRPr lang="en-US" sz="1600" dirty="0">
+              <a:solidFill>
+                <a:srgbClr val="292929"/>
+              </a:solidFill>
+            </a:endParaRPr>
+          </a:p>
+        </p:txBody>
+      </p:sp>
+      <p:pic>
+        <p:nvPicPr>
+          <p:cNvPr id="16" name="Picture 15">
+            <a:extLst>
+              <a:ext uri="{FF2B5EF4-FFF2-40B4-BE49-F238E27FC236}">
+                <a16:creationId xmlns:a16="http://schemas.microsoft.com/office/drawing/2014/main" id="{7A1BBF86-0286-41DF-91E8-0E1722A16DD0}"/>
+              </a:ext>
+            </a:extLst>
+          </p:cNvPr>
+          <p:cNvPicPr>
+            <a:picLocks noChangeAspect="1"/>
+          </p:cNvPicPr>
+          <p:nvPr/>
+        </p:nvPicPr>
+        <p:blipFill>
+          <a:blip r:embed="rId4"/>
+          <a:stretch>
+            <a:fillRect/>
+          </a:stretch>
+        </p:blipFill>
+        <p:spPr>
+          <a:xfrm>
+            <a:off x="8655252" y="3385510"/>
+            <a:ext cx="3235932" cy="1284602"/>
+          </a:xfrm>
+          <a:prstGeom prst="rect">
+            <a:avLst/>
+          </a:prstGeom>
+        </p:spPr>
+      </p:pic>
+      <p:sp>
+        <p:nvSpPr>
+          <p:cNvPr id="17" name="Equals 16">
+            <a:extLst>
+              <a:ext uri="{FF2B5EF4-FFF2-40B4-BE49-F238E27FC236}">
+                <a16:creationId xmlns:a16="http://schemas.microsoft.com/office/drawing/2014/main" id="{21834426-B175-443E-95EB-67E27113CF42}"/>
+              </a:ext>
+            </a:extLst>
+          </p:cNvPr>
+          <p:cNvSpPr/>
+          <p:nvPr/>
+        </p:nvSpPr>
+        <p:spPr bwMode="black">
+          <a:xfrm>
+            <a:off x="7731571" y="3708414"/>
+            <a:ext cx="762744" cy="724834"/>
+          </a:xfrm>
+          <a:prstGeom prst="mathEqual">
+            <a:avLst/>
+          </a:prstGeom>
+          <a:solidFill>
+            <a:srgbClr val="AEB785"/>
+          </a:solidFill>
+          <a:ln>
+            <a:noFill/>
+          </a:ln>
+          <a:extLst/>
+        </p:spPr>
+        <p:txBody>
+          <a:bodyPr vert="horz" wrap="square" lIns="82305" tIns="41153" rIns="82305" bIns="41153" numCol="1" rtlCol="0" anchor="t" anchorCtr="0" compatLnSpc="1">
+            <a:prstTxWarp prst="textNoShape">
+              <a:avLst/>
+            </a:prstTxWarp>
+          </a:bodyPr>
+          <a:lstStyle/>
+          <a:p>
+            <a:pPr algn="ctr" defTabSz="1218987"/>
+            <a:endParaRPr lang="en-US" sz="1600">
+              <a:solidFill>
+                <a:srgbClr val="292929"/>
+              </a:solidFill>
+            </a:endParaRPr>
+          </a:p>
+        </p:txBody>
+      </p:sp>
+    </p:spTree>
+    <p:extLst>
+      <p:ext uri="{BB962C8B-B14F-4D97-AF65-F5344CB8AC3E}">
+        <p14:creationId xmlns:p14="http://schemas.microsoft.com/office/powerpoint/2010/main" val="3896605557"/>
+      </p:ext>
+    </p:extLst>
+  </p:cSld>
+  <p:clrMapOvr>
+    <a:masterClrMapping/>
+  </p:clrMapOvr>
+</p:sld>
+</file>
+
+<file path=ppt/slides/slide13.xml><?xml version="1.0" encoding="utf-8"?>
+<p:sld xmlns:a="http://schemas.openxmlformats.org/drawingml/2006/main" xmlns:r="http://schemas.openxmlformats.org/officeDocument/2006/relationships" xmlns:p="http://schemas.openxmlformats.org/presentationml/2006/main">
+  <p:cSld>
+    <p:spTree>
+      <p:nvGrpSpPr>
+        <p:cNvPr id="1" name=""/>
+        <p:cNvGrpSpPr/>
+        <p:nvPr/>
+      </p:nvGrpSpPr>
+      <p:grpSpPr>
+        <a:xfrm>
+          <a:off x="0" y="0"/>
+          <a:ext cx="0" cy="0"/>
+          <a:chOff x="0" y="0"/>
+          <a:chExt cx="0" cy="0"/>
+        </a:xfrm>
+      </p:grpSpPr>
+      <p:sp>
+        <p:nvSpPr>
+          <p:cNvPr id="2" name="Text Placeholder 1">
+            <a:extLst>
+              <a:ext uri="{FF2B5EF4-FFF2-40B4-BE49-F238E27FC236}">
+                <a16:creationId xmlns:a16="http://schemas.microsoft.com/office/drawing/2014/main" id="{24228185-43F1-4B59-8747-6DFB0C832E28}"/>
+              </a:ext>
+            </a:extLst>
+          </p:cNvPr>
+          <p:cNvSpPr>
+            <a:spLocks noGrp="1"/>
+          </p:cNvSpPr>
+          <p:nvPr>
+            <p:ph type="body" sz="quarter" idx="11"/>
+          </p:nvPr>
+        </p:nvSpPr>
+        <p:spPr/>
+        <p:txBody>
+          <a:bodyPr/>
+          <a:lstStyle/>
+          <a:p>
+            <a:r>
+              <a:rPr lang="en-US" dirty="0"/>
+              <a:t>Azure ARM template demo</a:t>
+            </a:r>
+          </a:p>
+        </p:txBody>
+      </p:sp>
+    </p:spTree>
+    <p:extLst>
+      <p:ext uri="{BB962C8B-B14F-4D97-AF65-F5344CB8AC3E}">
+        <p14:creationId xmlns:p14="http://schemas.microsoft.com/office/powerpoint/2010/main" val="481867381"/>
+      </p:ext>
+    </p:extLst>
+  </p:cSld>
+  <p:clrMapOvr>
+    <a:masterClrMapping/>
+  </p:clrMapOvr>
+</p:sld>
+</file>
+
+<file path=ppt/slides/slide14.xml><?xml version="1.0" encoding="utf-8"?>
+<p:sld xmlns:a="http://schemas.openxmlformats.org/drawingml/2006/main" xmlns:r="http://schemas.openxmlformats.org/officeDocument/2006/relationships" xmlns:p="http://schemas.openxmlformats.org/presentationml/2006/main">
+  <p:cSld>
+    <p:spTree>
+      <p:nvGrpSpPr>
+        <p:cNvPr id="1" name=""/>
+        <p:cNvGrpSpPr/>
+        <p:nvPr/>
+      </p:nvGrpSpPr>
+      <p:grpSpPr>
+        <a:xfrm>
+          <a:off x="0" y="0"/>
+          <a:ext cx="0" cy="0"/>
+          <a:chOff x="0" y="0"/>
+          <a:chExt cx="0" cy="0"/>
+        </a:xfrm>
+      </p:grpSpPr>
     </p:spTree>
     <p:extLst>
       <p:ext uri="{BB962C8B-B14F-4D97-AF65-F5344CB8AC3E}">
@@ -11801,7 +13134,7 @@
 </p:sld>
 </file>
 
-<file path=ppt/slides/slide11.xml><?xml version="1.0" encoding="utf-8"?>
+<file path=ppt/slides/slide15.xml><?xml version="1.0" encoding="utf-8"?>
 <p:sld xmlns:a="http://schemas.openxmlformats.org/drawingml/2006/main" xmlns:r="http://schemas.openxmlformats.org/officeDocument/2006/relationships" xmlns:p="http://schemas.openxmlformats.org/presentationml/2006/main">
   <p:cSld>
     <p:spTree>
@@ -12382,13 +13715,8 @@
           <a:p>
             <a:r>
               <a:rPr lang="en-US" dirty="0"/>
-              <a:t>Azure ARM </a:t>
-            </a:r>
-            <a:r>
-              <a:rPr lang="en-US" dirty="0" err="1"/>
-              <a:t>Ventajas</a:t>
-            </a:r>
-            <a:endParaRPr lang="en-US" dirty="0"/>
+              <a:t>Azure ARM benefits</a:t>
+            </a:r>
           </a:p>
         </p:txBody>
       </p:sp>
@@ -12920,6 +14248,42 @@
           </a:p>
         </p:txBody>
       </p:sp>
+      <p:pic>
+        <p:nvPicPr>
+          <p:cNvPr id="8" name="Picture 7">
+            <a:extLst>
+              <a:ext uri="{FF2B5EF4-FFF2-40B4-BE49-F238E27FC236}">
+                <a16:creationId xmlns:a16="http://schemas.microsoft.com/office/drawing/2014/main" id="{454FCC22-BFD5-496E-A30C-7B0F7D9D0473}"/>
+              </a:ext>
+            </a:extLst>
+          </p:cNvPr>
+          <p:cNvPicPr>
+            <a:picLocks noChangeAspect="1"/>
+          </p:cNvPicPr>
+          <p:nvPr/>
+        </p:nvPicPr>
+        <p:blipFill>
+          <a:blip r:embed="rId3">
+            <a:extLst>
+              <a:ext uri="{28A0092B-C50C-407E-A947-70E740481C1C}">
+                <a14:useLocalDpi xmlns:a14="http://schemas.microsoft.com/office/drawing/2010/main" val="0"/>
+              </a:ext>
+            </a:extLst>
+          </a:blip>
+          <a:stretch>
+            <a:fillRect/>
+          </a:stretch>
+        </p:blipFill>
+        <p:spPr>
+          <a:xfrm>
+            <a:off x="4451221" y="4031674"/>
+            <a:ext cx="3352800" cy="2381250"/>
+          </a:xfrm>
+          <a:prstGeom prst="rect">
+            <a:avLst/>
+          </a:prstGeom>
+        </p:spPr>
+      </p:pic>
     </p:spTree>
     <p:extLst>
       <p:ext uri="{BB962C8B-B14F-4D97-AF65-F5344CB8AC3E}">
@@ -12930,6 +14294,81 @@
   <p:clrMapOvr>
     <a:masterClrMapping/>
   </p:clrMapOvr>
+  <p:timing>
+    <p:tnLst>
+      <p:par>
+        <p:cTn id="1" dur="indefinite" restart="never" nodeType="tmRoot">
+          <p:childTnLst>
+            <p:seq concurrent="1" nextAc="seek">
+              <p:cTn id="2" dur="indefinite" nodeType="mainSeq">
+                <p:childTnLst>
+                  <p:par>
+                    <p:cTn id="3" fill="hold">
+                      <p:stCondLst>
+                        <p:cond delay="indefinite"/>
+                      </p:stCondLst>
+                      <p:childTnLst>
+                        <p:par>
+                          <p:cTn id="4" fill="hold">
+                            <p:stCondLst>
+                              <p:cond delay="0"/>
+                            </p:stCondLst>
+                            <p:childTnLst>
+                              <p:par>
+                                <p:cTn id="5" presetID="1" presetClass="entr" presetSubtype="0" fill="hold" nodeType="clickEffect">
+                                  <p:stCondLst>
+                                    <p:cond delay="0"/>
+                                  </p:stCondLst>
+                                  <p:childTnLst>
+                                    <p:set>
+                                      <p:cBhvr>
+                                        <p:cTn id="6" dur="1" fill="hold">
+                                          <p:stCondLst>
+                                            <p:cond delay="0"/>
+                                          </p:stCondLst>
+                                        </p:cTn>
+                                        <p:tgtEl>
+                                          <p:spTgt spid="8"/>
+                                        </p:tgtEl>
+                                        <p:attrNameLst>
+                                          <p:attrName>style.visibility</p:attrName>
+                                        </p:attrNameLst>
+                                      </p:cBhvr>
+                                      <p:to>
+                                        <p:strVal val="visible"/>
+                                      </p:to>
+                                    </p:set>
+                                  </p:childTnLst>
+                                </p:cTn>
+                              </p:par>
+                            </p:childTnLst>
+                          </p:cTn>
+                        </p:par>
+                      </p:childTnLst>
+                    </p:cTn>
+                  </p:par>
+                </p:childTnLst>
+              </p:cTn>
+              <p:prevCondLst>
+                <p:cond evt="onPrev" delay="0">
+                  <p:tgtEl>
+                    <p:sldTgt/>
+                  </p:tgtEl>
+                </p:cond>
+              </p:prevCondLst>
+              <p:nextCondLst>
+                <p:cond evt="onNext" delay="0">
+                  <p:tgtEl>
+                    <p:sldTgt/>
+                  </p:tgtEl>
+                </p:cond>
+              </p:nextCondLst>
+            </p:seq>
+          </p:childTnLst>
+        </p:cTn>
+      </p:par>
+    </p:tnLst>
+  </p:timing>
 </p:sld>
 </file>
 

</xml_diff>